<commit_message>
Minor expansions and revisions
</commit_message>
<xml_diff>
--- a/Dokumente/Präsentation.pptx
+++ b/Dokumente/Präsentation.pptx
@@ -235,7 +235,7 @@
           <a:p>
             <a:fld id="{A314B821-B968-4E43-8B36-A4F1C6486253}" type="datetimeFigureOut">
               <a:rPr lang="de-DE" smtClean="0"/>
-              <a:t>08.12.2022</a:t>
+              <a:t>09.12.2022</a:t>
             </a:fld>
             <a:endParaRPr lang="de-DE"/>
           </a:p>
@@ -1316,7 +1316,7 @@
           <a:p>
             <a:fld id="{6E7377B8-7098-4304-968E-D69D6386D549}" type="datetimeFigureOut">
               <a:rPr lang="de-DE" smtClean="0"/>
-              <a:t>08.12.2022</a:t>
+              <a:t>09.12.2022</a:t>
             </a:fld>
             <a:endParaRPr lang="de-DE" dirty="0"/>
           </a:p>
@@ -1783,7 +1783,7 @@
           <a:p>
             <a:fld id="{6E7377B8-7098-4304-968E-D69D6386D549}" type="datetimeFigureOut">
               <a:rPr lang="de-DE" smtClean="0"/>
-              <a:t>08.12.2022</a:t>
+              <a:t>09.12.2022</a:t>
             </a:fld>
             <a:endParaRPr lang="de-DE"/>
           </a:p>
@@ -2351,7 +2351,7 @@
           <a:p>
             <a:fld id="{6E7377B8-7098-4304-968E-D69D6386D549}" type="datetimeFigureOut">
               <a:rPr lang="de-DE" smtClean="0"/>
-              <a:t>08.12.2022</a:t>
+              <a:t>09.12.2022</a:t>
             </a:fld>
             <a:endParaRPr lang="de-DE"/>
           </a:p>
@@ -2653,7 +2653,7 @@
           <a:p>
             <a:fld id="{6E7377B8-7098-4304-968E-D69D6386D549}" type="datetimeFigureOut">
               <a:rPr lang="de-DE" smtClean="0"/>
-              <a:t>08.12.2022</a:t>
+              <a:t>09.12.2022</a:t>
             </a:fld>
             <a:endParaRPr lang="de-DE"/>
           </a:p>
@@ -2933,7 +2933,7 @@
           <a:p>
             <a:fld id="{6E7377B8-7098-4304-968E-D69D6386D549}" type="datetimeFigureOut">
               <a:rPr lang="de-DE" smtClean="0"/>
-              <a:t>08.12.2022</a:t>
+              <a:t>09.12.2022</a:t>
             </a:fld>
             <a:endParaRPr lang="de-DE"/>
           </a:p>
@@ -4203,7 +4203,7 @@
             <a:fld id="{6E7377B8-7098-4304-968E-D69D6386D549}" type="datetimeFigureOut">
               <a:rPr lang="de-DE" smtClean="0"/>
               <a:pPr/>
-              <a:t>08.12.2022</a:t>
+              <a:t>09.12.2022</a:t>
             </a:fld>
             <a:endParaRPr lang="de-DE" dirty="0"/>
           </a:p>
@@ -4706,62 +4706,81 @@
           <a:p>
             <a:r>
               <a:rPr lang="de-DE" dirty="0" smtClean="0"/>
-              <a:t>Usability erhöht</a:t>
-            </a:r>
+              <a:t>Usability </a:t>
+            </a:r>
+            <a:endParaRPr lang="de-DE" dirty="0" smtClean="0"/>
           </a:p>
           <a:p>
             <a:pPr lvl="1"/>
             <a:r>
               <a:rPr lang="de-DE" dirty="0" smtClean="0"/>
-              <a:t>Wahlen leichter konfigurierbar</a:t>
+              <a:t>Wahlen </a:t>
+            </a:r>
+            <a:r>
+              <a:rPr lang="de-DE" dirty="0" smtClean="0"/>
+              <a:t>leichter konfigurierbar</a:t>
             </a:r>
           </a:p>
           <a:p>
             <a:pPr lvl="1"/>
             <a:r>
-              <a:rPr lang="de-DE" dirty="0" smtClean="0"/>
-              <a:t>Website leichter zu bedienen</a:t>
-            </a:r>
-          </a:p>
-          <a:p>
-            <a:r>
-              <a:rPr lang="de-DE" dirty="0" smtClean="0"/>
-              <a:t>Blockchain verifizierbar</a:t>
+              <a:rPr lang="de-DE" smtClean="0"/>
+              <a:t>Frontend (Website) </a:t>
+            </a:r>
+            <a:r>
+              <a:rPr lang="de-DE" dirty="0" smtClean="0"/>
+              <a:t>leichter zu bedienen</a:t>
+            </a:r>
+          </a:p>
+          <a:p>
+            <a:r>
+              <a:rPr lang="de-DE" smtClean="0"/>
+              <a:t>Verifiability</a:t>
             </a:r>
           </a:p>
           <a:p>
             <a:pPr lvl="1"/>
             <a:r>
-              <a:rPr lang="de-DE" dirty="0" smtClean="0"/>
-              <a:t>Sinnvolle Verwendung für Blockchain</a:t>
-            </a:r>
+              <a:rPr lang="de-DE" smtClean="0"/>
+              <a:t>Sinnvolle </a:t>
+            </a:r>
+            <a:r>
+              <a:rPr lang="de-DE" dirty="0" smtClean="0"/>
+              <a:t>Verwendung </a:t>
+            </a:r>
+            <a:r>
+              <a:rPr lang="de-DE" smtClean="0"/>
+              <a:t>für </a:t>
+            </a:r>
+            <a:r>
+              <a:rPr lang="de-DE" smtClean="0"/>
+              <a:t>Blockchain</a:t>
+            </a:r>
+            <a:endParaRPr lang="de-DE" dirty="0" smtClean="0"/>
           </a:p>
           <a:p>
             <a:pPr lvl="1"/>
             <a:r>
               <a:rPr lang="de-DE" dirty="0" smtClean="0"/>
-              <a:t>Schritt hin zu Verifizierbarkeit</a:t>
-            </a:r>
-          </a:p>
-          <a:p>
-            <a:r>
-              <a:rPr lang="de-DE" dirty="0" smtClean="0"/>
-              <a:t>Wahlfunktionen zeitlich beschränkt</a:t>
+              <a:t>Schritt hin zu </a:t>
+            </a:r>
+            <a:r>
+              <a:rPr lang="de-DE" dirty="0" smtClean="0"/>
+              <a:t>vollständiger Verifizierbarkeit, weniger Vertrauen nötig</a:t>
+            </a:r>
+            <a:endParaRPr lang="de-DE" dirty="0" smtClean="0"/>
+          </a:p>
+          <a:p>
+            <a:r>
+              <a:rPr lang="de-DE" smtClean="0"/>
+              <a:t>Secrecy</a:t>
             </a:r>
           </a:p>
           <a:p>
             <a:pPr lvl="1"/>
             <a:r>
-              <a:rPr lang="de-DE" dirty="0" smtClean="0"/>
-              <a:t>Auszählungsangriff verhindert -&gt; </a:t>
-            </a:r>
-            <a:r>
-              <a:rPr lang="de-DE" dirty="0" err="1" smtClean="0"/>
-              <a:t>Vote</a:t>
-            </a:r>
-            <a:r>
-              <a:rPr lang="de-DE" dirty="0" smtClean="0"/>
-              <a:t> Secrecy verbessert </a:t>
+              <a:rPr lang="de-DE" smtClean="0"/>
+              <a:t>Auszählungsangriff verhindert</a:t>
             </a:r>
             <a:endParaRPr lang="de-DE" dirty="0"/>
           </a:p>
@@ -5139,8 +5158,16 @@
           </a:p>
           <a:p>
             <a:r>
-              <a:rPr lang="de-DE" dirty="0" smtClean="0"/>
-              <a:t>Zahlreiche Schwächen vorhanden</a:t>
+              <a:rPr lang="de-DE" smtClean="0"/>
+              <a:t>Noch z</a:t>
+            </a:r>
+            <a:r>
+              <a:rPr lang="de-DE" smtClean="0"/>
+              <a:t>ahlreiche </a:t>
+            </a:r>
+            <a:r>
+              <a:rPr lang="de-DE" dirty="0" smtClean="0"/>
+              <a:t>Schwächen vorhanden</a:t>
             </a:r>
           </a:p>
           <a:p>
@@ -6096,7 +6123,46 @@
           <a:bodyPr/>
           <a:lstStyle/>
           <a:p>
-            <a:endParaRPr lang="de-DE"/>
+            <a:r>
+              <a:rPr lang="de-DE" dirty="0" smtClean="0"/>
+              <a:t>Technische Probleme/potenzielle Bugs beseitigt</a:t>
+            </a:r>
+          </a:p>
+          <a:p>
+            <a:r>
+              <a:rPr lang="de-DE" dirty="0" smtClean="0"/>
+              <a:t>Frontend (Website) überarbeitet</a:t>
+            </a:r>
+          </a:p>
+          <a:p>
+            <a:r>
+              <a:rPr lang="de-DE" dirty="0" smtClean="0"/>
+              <a:t>Admin-Frontend geschrieben</a:t>
+            </a:r>
+          </a:p>
+          <a:p>
+            <a:r>
+              <a:rPr lang="de-DE" dirty="0" smtClean="0"/>
+              <a:t>Wahlparameter konfigurierbar</a:t>
+            </a:r>
+          </a:p>
+          <a:p>
+            <a:r>
+              <a:rPr lang="de-DE" dirty="0" smtClean="0"/>
+              <a:t>Wahlfunktion nur noch zeitlich beschränkt verfügbar</a:t>
+            </a:r>
+          </a:p>
+          <a:p>
+            <a:r>
+              <a:rPr lang="de-DE" dirty="0" smtClean="0"/>
+              <a:t>Verifizierungsmöglichkeit für Blockchain geschaffen</a:t>
+            </a:r>
+          </a:p>
+          <a:p>
+            <a:endParaRPr lang="de-DE" dirty="0" smtClean="0"/>
+          </a:p>
+          <a:p>
+            <a:endParaRPr lang="de-DE" dirty="0"/>
           </a:p>
         </p:txBody>
       </p:sp>
@@ -6870,6 +6936,15 @@
 </file>
 
 <file path=customXml/item2.xml><?xml version="1.0" encoding="utf-8"?>
+<?mso-contentType ?>
+<FormTemplates xmlns="http://schemas.microsoft.com/sharepoint/v3/contenttype/forms">
+  <Display>DocumentLibraryForm</Display>
+  <Edit>DocumentLibraryForm</Edit>
+  <New>DocumentLibraryForm</New>
+</FormTemplates>
+</file>
+
+<file path=customXml/item3.xml><?xml version="1.0" encoding="utf-8"?>
 <p:properties xmlns:p="http://schemas.microsoft.com/office/2006/metadata/properties" xmlns:xsi="http://www.w3.org/2001/XMLSchema-instance" xmlns:pc="http://schemas.microsoft.com/office/infopath/2007/PartnerControls">
   <documentManagement>
     <TaxCatchAll xmlns="2849ec3c-3bba-402d-9ba5-165a61c8a092">
@@ -6902,15 +6977,6 @@
 </p:properties>
 </file>
 
-<file path=customXml/item3.xml><?xml version="1.0" encoding="utf-8"?>
-<?mso-contentType ?>
-<FormTemplates xmlns="http://schemas.microsoft.com/sharepoint/v3/contenttype/forms">
-  <Display>DocumentLibraryForm</Display>
-  <Edit>DocumentLibraryForm</Edit>
-  <New>DocumentLibraryForm</New>
-</FormTemplates>
-</file>
-
 <file path=customXml/itemProps1.xml><?xml version="1.0" encoding="utf-8"?>
 <ds:datastoreItem xmlns:ds="http://schemas.openxmlformats.org/officeDocument/2006/customXml" ds:itemID="{6BE2C83F-96C6-4D07-993C-D7FB1347CBA4}">
   <ds:schemaRefs>
@@ -6932,6 +6998,14 @@
 </file>
 
 <file path=customXml/itemProps2.xml><?xml version="1.0" encoding="utf-8"?>
+<ds:datastoreItem xmlns:ds="http://schemas.openxmlformats.org/officeDocument/2006/customXml" ds:itemID="{7B0EAF80-A70D-4FE4-8D4E-5892E0845FA2}">
+  <ds:schemaRefs>
+    <ds:schemaRef ds:uri="http://schemas.microsoft.com/sharepoint/v3/contenttype/forms"/>
+  </ds:schemaRefs>
+</ds:datastoreItem>
+</file>
+
+<file path=customXml/itemProps3.xml><?xml version="1.0" encoding="utf-8"?>
 <ds:datastoreItem xmlns:ds="http://schemas.openxmlformats.org/officeDocument/2006/customXml" ds:itemID="{E9F8F853-DB14-4E26-9159-30E314C55244}">
   <ds:schemaRefs>
     <ds:schemaRef ds:uri="http://schemas.openxmlformats.org/package/2006/metadata/core-properties"/>
@@ -6947,12 +7021,4 @@
     <ds:schemaRef ds:uri="http://purl.org/dc/dcmitype/"/>
   </ds:schemaRefs>
 </ds:datastoreItem>
-</file>
-
-<file path=customXml/itemProps3.xml><?xml version="1.0" encoding="utf-8"?>
-<ds:datastoreItem xmlns:ds="http://schemas.openxmlformats.org/officeDocument/2006/customXml" ds:itemID="{7B0EAF80-A70D-4FE4-8D4E-5892E0845FA2}">
-  <ds:schemaRefs>
-    <ds:schemaRef ds:uri="http://schemas.microsoft.com/sharepoint/v3/contenttype/forms"/>
-  </ds:schemaRefs>
-</ds:datastoreItem>
 </file>
</xml_diff>

<commit_message>
Präsentation Fehler Client/Server korrigiert
</commit_message>
<xml_diff>
--- a/Dokumente/Präsentation.pptx
+++ b/Dokumente/Präsentation.pptx
@@ -235,7 +235,7 @@
           <a:p>
             <a:fld id="{A314B821-B968-4E43-8B36-A4F1C6486253}" type="datetimeFigureOut">
               <a:rPr lang="de-DE" smtClean="0"/>
-              <a:t>09.12.2022</a:t>
+              <a:t>16.12.2022</a:t>
             </a:fld>
             <a:endParaRPr lang="de-DE"/>
           </a:p>
@@ -1316,7 +1316,7 @@
           <a:p>
             <a:fld id="{6E7377B8-7098-4304-968E-D69D6386D549}" type="datetimeFigureOut">
               <a:rPr lang="de-DE" smtClean="0"/>
-              <a:t>09.12.2022</a:t>
+              <a:t>16.12.2022</a:t>
             </a:fld>
             <a:endParaRPr lang="de-DE" dirty="0"/>
           </a:p>
@@ -1783,7 +1783,7 @@
           <a:p>
             <a:fld id="{6E7377B8-7098-4304-968E-D69D6386D549}" type="datetimeFigureOut">
               <a:rPr lang="de-DE" smtClean="0"/>
-              <a:t>09.12.2022</a:t>
+              <a:t>16.12.2022</a:t>
             </a:fld>
             <a:endParaRPr lang="de-DE"/>
           </a:p>
@@ -2351,7 +2351,7 @@
           <a:p>
             <a:fld id="{6E7377B8-7098-4304-968E-D69D6386D549}" type="datetimeFigureOut">
               <a:rPr lang="de-DE" smtClean="0"/>
-              <a:t>09.12.2022</a:t>
+              <a:t>16.12.2022</a:t>
             </a:fld>
             <a:endParaRPr lang="de-DE"/>
           </a:p>
@@ -2653,7 +2653,7 @@
           <a:p>
             <a:fld id="{6E7377B8-7098-4304-968E-D69D6386D549}" type="datetimeFigureOut">
               <a:rPr lang="de-DE" smtClean="0"/>
-              <a:t>09.12.2022</a:t>
+              <a:t>16.12.2022</a:t>
             </a:fld>
             <a:endParaRPr lang="de-DE"/>
           </a:p>
@@ -2933,7 +2933,7 @@
           <a:p>
             <a:fld id="{6E7377B8-7098-4304-968E-D69D6386D549}" type="datetimeFigureOut">
               <a:rPr lang="de-DE" smtClean="0"/>
-              <a:t>09.12.2022</a:t>
+              <a:t>16.12.2022</a:t>
             </a:fld>
             <a:endParaRPr lang="de-DE"/>
           </a:p>
@@ -4203,7 +4203,7 @@
             <a:fld id="{6E7377B8-7098-4304-968E-D69D6386D549}" type="datetimeFigureOut">
               <a:rPr lang="de-DE" smtClean="0"/>
               <a:pPr/>
-              <a:t>09.12.2022</a:t>
+              <a:t>16.12.2022</a:t>
             </a:fld>
             <a:endParaRPr lang="de-DE" dirty="0"/>
           </a:p>
@@ -4708,17 +4708,12 @@
               <a:rPr lang="de-DE" dirty="0" smtClean="0"/>
               <a:t>Usability </a:t>
             </a:r>
-            <a:endParaRPr lang="de-DE" dirty="0" smtClean="0"/>
           </a:p>
           <a:p>
             <a:pPr lvl="1"/>
             <a:r>
               <a:rPr lang="de-DE" dirty="0" smtClean="0"/>
-              <a:t>Wahlen </a:t>
-            </a:r>
-            <a:r>
-              <a:rPr lang="de-DE" dirty="0" smtClean="0"/>
-              <a:t>leichter konfigurierbar</a:t>
+              <a:t>Wahlen leichter konfigurierbar</a:t>
             </a:r>
           </a:p>
           <a:p>
@@ -4750,11 +4745,7 @@
             </a:r>
             <a:r>
               <a:rPr lang="de-DE" smtClean="0"/>
-              <a:t>für </a:t>
-            </a:r>
-            <a:r>
-              <a:rPr lang="de-DE" smtClean="0"/>
-              <a:t>Blockchain</a:t>
+              <a:t>für Blockchain</a:t>
             </a:r>
             <a:endParaRPr lang="de-DE" dirty="0" smtClean="0"/>
           </a:p>
@@ -4762,13 +4753,8 @@
             <a:pPr lvl="1"/>
             <a:r>
               <a:rPr lang="de-DE" dirty="0" smtClean="0"/>
-              <a:t>Schritt hin zu </a:t>
-            </a:r>
-            <a:r>
-              <a:rPr lang="de-DE" dirty="0" smtClean="0"/>
-              <a:t>vollständiger Verifizierbarkeit, weniger Vertrauen nötig</a:t>
-            </a:r>
-            <a:endParaRPr lang="de-DE" dirty="0" smtClean="0"/>
+              <a:t>Schritt hin zu vollständiger Verifizierbarkeit, weniger Vertrauen nötig</a:t>
+            </a:r>
           </a:p>
           <a:p>
             <a:r>
@@ -4819,6 +4805,13 @@
   <p:clrMapOvr>
     <a:masterClrMapping/>
   </p:clrMapOvr>
+  <p:timing>
+    <p:tnLst>
+      <p:par>
+        <p:cTn id="1" dur="indefinite" restart="never" nodeType="tmRoot"/>
+      </p:par>
+    </p:tnLst>
+  </p:timing>
 </p:sld>
 </file>
 
@@ -4891,7 +4884,15 @@
             <a:pPr lvl="1"/>
             <a:r>
               <a:rPr lang="de-DE" dirty="0" smtClean="0"/>
-              <a:t>Kryptographie hin zum Server verlagern</a:t>
+              <a:t>Kryptographie hin </a:t>
+            </a:r>
+            <a:r>
+              <a:rPr lang="de-DE" dirty="0" smtClean="0"/>
+              <a:t>zum Client </a:t>
+            </a:r>
+            <a:r>
+              <a:rPr lang="de-DE" dirty="0" smtClean="0"/>
+              <a:t>verlagern</a:t>
             </a:r>
           </a:p>
           <a:p>
@@ -4965,6 +4966,13 @@
   <p:clrMapOvr>
     <a:masterClrMapping/>
   </p:clrMapOvr>
+  <p:timing>
+    <p:tnLst>
+      <p:par>
+        <p:cTn id="1" dur="indefinite" restart="never" nodeType="tmRoot"/>
+      </p:par>
+    </p:tnLst>
+  </p:timing>
 </p:sld>
 </file>
 
@@ -5108,6 +5116,13 @@
   <p:clrMapOvr>
     <a:masterClrMapping/>
   </p:clrMapOvr>
+  <p:timing>
+    <p:tnLst>
+      <p:par>
+        <p:cTn id="1" dur="indefinite" restart="never" nodeType="tmRoot"/>
+      </p:par>
+    </p:tnLst>
+  </p:timing>
 </p:sld>
 </file>
 
@@ -5159,11 +5174,7 @@
           <a:p>
             <a:r>
               <a:rPr lang="de-DE" smtClean="0"/>
-              <a:t>Noch z</a:t>
-            </a:r>
-            <a:r>
-              <a:rPr lang="de-DE" smtClean="0"/>
-              <a:t>ahlreiche </a:t>
+              <a:t>Noch zahlreiche </a:t>
             </a:r>
             <a:r>
               <a:rPr lang="de-DE" dirty="0" smtClean="0"/>
@@ -5226,6 +5237,13 @@
   <p:clrMapOvr>
     <a:masterClrMapping/>
   </p:clrMapOvr>
+  <p:timing>
+    <p:tnLst>
+      <p:par>
+        <p:cTn id="1" dur="indefinite" restart="never" nodeType="tmRoot"/>
+      </p:par>
+    </p:tnLst>
+  </p:timing>
 </p:sld>
 </file>
 
@@ -5336,6 +5354,13 @@
   <p:clrMapOvr>
     <a:masterClrMapping/>
   </p:clrMapOvr>
+  <p:timing>
+    <p:tnLst>
+      <p:par>
+        <p:cTn id="1" dur="indefinite" restart="never" nodeType="tmRoot"/>
+      </p:par>
+    </p:tnLst>
+  </p:timing>
 </p:sld>
 </file>
 
@@ -5446,6 +5471,13 @@
   <p:clrMapOvr>
     <a:masterClrMapping/>
   </p:clrMapOvr>
+  <p:timing>
+    <p:tnLst>
+      <p:par>
+        <p:cTn id="1" dur="indefinite" restart="never" nodeType="tmRoot"/>
+      </p:par>
+    </p:tnLst>
+  </p:timing>
 </p:sld>
 </file>
 
@@ -5592,6 +5624,13 @@
   <p:clrMapOvr>
     <a:masterClrMapping/>
   </p:clrMapOvr>
+  <p:timing>
+    <p:tnLst>
+      <p:par>
+        <p:cTn id="1" dur="indefinite" restart="never" nodeType="tmRoot"/>
+      </p:par>
+    </p:tnLst>
+  </p:timing>
 </p:sld>
 </file>
 
@@ -5739,6 +5778,13 @@
   <p:clrMapOvr>
     <a:masterClrMapping/>
   </p:clrMapOvr>
+  <p:timing>
+    <p:tnLst>
+      <p:par>
+        <p:cTn id="1" dur="indefinite" restart="never" nodeType="tmRoot"/>
+      </p:par>
+    </p:tnLst>
+  </p:timing>
 </p:sld>
 </file>
 
@@ -5821,6 +5867,13 @@
   <p:clrMapOvr>
     <a:masterClrMapping/>
   </p:clrMapOvr>
+  <p:timing>
+    <p:tnLst>
+      <p:par>
+        <p:cTn id="1" dur="indefinite" restart="never" nodeType="tmRoot"/>
+      </p:par>
+    </p:tnLst>
+  </p:timing>
 </p:sld>
 </file>
 
@@ -5969,6 +6022,13 @@
   <p:clrMapOvr>
     <a:masterClrMapping/>
   </p:clrMapOvr>
+  <p:timing>
+    <p:tnLst>
+      <p:par>
+        <p:cTn id="1" dur="indefinite" restart="never" nodeType="tmRoot"/>
+      </p:par>
+    </p:tnLst>
+  </p:timing>
 </p:sld>
 </file>
 
@@ -6088,6 +6148,13 @@
   <p:clrMapOvr>
     <a:masterClrMapping/>
   </p:clrMapOvr>
+  <p:timing>
+    <p:tnLst>
+      <p:par>
+        <p:cTn id="1" dur="indefinite" restart="never" nodeType="tmRoot"/>
+      </p:par>
+    </p:tnLst>
+  </p:timing>
 </p:sld>
 </file>
 
@@ -6199,6 +6266,13 @@
   <p:clrMapOvr>
     <a:masterClrMapping/>
   </p:clrMapOvr>
+  <p:timing>
+    <p:tnLst>
+      <p:par>
+        <p:cTn id="1" dur="indefinite" restart="never" nodeType="tmRoot"/>
+      </p:par>
+    </p:tnLst>
+  </p:timing>
 </p:sld>
 </file>
 
@@ -6936,15 +7010,6 @@
 </file>
 
 <file path=customXml/item2.xml><?xml version="1.0" encoding="utf-8"?>
-<?mso-contentType ?>
-<FormTemplates xmlns="http://schemas.microsoft.com/sharepoint/v3/contenttype/forms">
-  <Display>DocumentLibraryForm</Display>
-  <Edit>DocumentLibraryForm</Edit>
-  <New>DocumentLibraryForm</New>
-</FormTemplates>
-</file>
-
-<file path=customXml/item3.xml><?xml version="1.0" encoding="utf-8"?>
 <p:properties xmlns:p="http://schemas.microsoft.com/office/2006/metadata/properties" xmlns:xsi="http://www.w3.org/2001/XMLSchema-instance" xmlns:pc="http://schemas.microsoft.com/office/infopath/2007/PartnerControls">
   <documentManagement>
     <TaxCatchAll xmlns="2849ec3c-3bba-402d-9ba5-165a61c8a092">
@@ -6977,6 +7042,15 @@
 </p:properties>
 </file>
 
+<file path=customXml/item3.xml><?xml version="1.0" encoding="utf-8"?>
+<?mso-contentType ?>
+<FormTemplates xmlns="http://schemas.microsoft.com/sharepoint/v3/contenttype/forms">
+  <Display>DocumentLibraryForm</Display>
+  <Edit>DocumentLibraryForm</Edit>
+  <New>DocumentLibraryForm</New>
+</FormTemplates>
+</file>
+
 <file path=customXml/itemProps1.xml><?xml version="1.0" encoding="utf-8"?>
 <ds:datastoreItem xmlns:ds="http://schemas.openxmlformats.org/officeDocument/2006/customXml" ds:itemID="{6BE2C83F-96C6-4D07-993C-D7FB1347CBA4}">
   <ds:schemaRefs>
@@ -6998,14 +7072,6 @@
 </file>
 
 <file path=customXml/itemProps2.xml><?xml version="1.0" encoding="utf-8"?>
-<ds:datastoreItem xmlns:ds="http://schemas.openxmlformats.org/officeDocument/2006/customXml" ds:itemID="{7B0EAF80-A70D-4FE4-8D4E-5892E0845FA2}">
-  <ds:schemaRefs>
-    <ds:schemaRef ds:uri="http://schemas.microsoft.com/sharepoint/v3/contenttype/forms"/>
-  </ds:schemaRefs>
-</ds:datastoreItem>
-</file>
-
-<file path=customXml/itemProps3.xml><?xml version="1.0" encoding="utf-8"?>
 <ds:datastoreItem xmlns:ds="http://schemas.openxmlformats.org/officeDocument/2006/customXml" ds:itemID="{E9F8F853-DB14-4E26-9159-30E314C55244}">
   <ds:schemaRefs>
     <ds:schemaRef ds:uri="http://schemas.openxmlformats.org/package/2006/metadata/core-properties"/>
@@ -7021,4 +7087,12 @@
     <ds:schemaRef ds:uri="http://purl.org/dc/dcmitype/"/>
   </ds:schemaRefs>
 </ds:datastoreItem>
+</file>
+
+<file path=customXml/itemProps3.xml><?xml version="1.0" encoding="utf-8"?>
+<ds:datastoreItem xmlns:ds="http://schemas.openxmlformats.org/officeDocument/2006/customXml" ds:itemID="{7B0EAF80-A70D-4FE4-8D4E-5892E0845FA2}">
+  <ds:schemaRefs>
+    <ds:schemaRef ds:uri="http://schemas.microsoft.com/sharepoint/v3/contenttype/forms"/>
+  </ds:schemaRefs>
+</ds:datastoreItem>
 </file>
</xml_diff>